<commit_message>
Add Getting Started course logo
</commit_message>
<xml_diff>
--- a/ehden_academy_course_images.pptx
+++ b/ehden_academy_course_images.pptx
@@ -7,6 +7,7 @@
   <p:sldIdLst>
     <p:sldId id="256" r:id="rId2"/>
     <p:sldId id="257" r:id="rId3"/>
+    <p:sldId id="258" r:id="rId4"/>
   </p:sldIdLst>
   <p:sldSz cx="6096000" cy="2667000"/>
   <p:notesSz cx="6858000" cy="9144000"/>
@@ -244,7 +245,7 @@
           <a:p>
             <a:fld id="{9D9F4DAA-4C78-4901-83E9-F4ACD2ADA5B7}" type="datetimeFigureOut">
               <a:rPr lang="en-US" smtClean="0"/>
-              <a:t>03/06/2019</a:t>
+              <a:t>2/14/20</a:t>
             </a:fld>
             <a:endParaRPr lang="en-US"/>
           </a:p>
@@ -414,7 +415,7 @@
           <a:p>
             <a:fld id="{9D9F4DAA-4C78-4901-83E9-F4ACD2ADA5B7}" type="datetimeFigureOut">
               <a:rPr lang="en-US" smtClean="0"/>
-              <a:t>03/06/2019</a:t>
+              <a:t>2/14/20</a:t>
             </a:fld>
             <a:endParaRPr lang="en-US"/>
           </a:p>
@@ -594,7 +595,7 @@
           <a:p>
             <a:fld id="{9D9F4DAA-4C78-4901-83E9-F4ACD2ADA5B7}" type="datetimeFigureOut">
               <a:rPr lang="en-US" smtClean="0"/>
-              <a:t>03/06/2019</a:t>
+              <a:t>2/14/20</a:t>
             </a:fld>
             <a:endParaRPr lang="en-US"/>
           </a:p>
@@ -764,7 +765,7 @@
           <a:p>
             <a:fld id="{9D9F4DAA-4C78-4901-83E9-F4ACD2ADA5B7}" type="datetimeFigureOut">
               <a:rPr lang="en-US" smtClean="0"/>
-              <a:t>03/06/2019</a:t>
+              <a:t>2/14/20</a:t>
             </a:fld>
             <a:endParaRPr lang="en-US"/>
           </a:p>
@@ -1010,7 +1011,7 @@
           <a:p>
             <a:fld id="{9D9F4DAA-4C78-4901-83E9-F4ACD2ADA5B7}" type="datetimeFigureOut">
               <a:rPr lang="en-US" smtClean="0"/>
-              <a:t>03/06/2019</a:t>
+              <a:t>2/14/20</a:t>
             </a:fld>
             <a:endParaRPr lang="en-US"/>
           </a:p>
@@ -1242,7 +1243,7 @@
           <a:p>
             <a:fld id="{9D9F4DAA-4C78-4901-83E9-F4ACD2ADA5B7}" type="datetimeFigureOut">
               <a:rPr lang="en-US" smtClean="0"/>
-              <a:t>03/06/2019</a:t>
+              <a:t>2/14/20</a:t>
             </a:fld>
             <a:endParaRPr lang="en-US"/>
           </a:p>
@@ -1609,7 +1610,7 @@
           <a:p>
             <a:fld id="{9D9F4DAA-4C78-4901-83E9-F4ACD2ADA5B7}" type="datetimeFigureOut">
               <a:rPr lang="en-US" smtClean="0"/>
-              <a:t>03/06/2019</a:t>
+              <a:t>2/14/20</a:t>
             </a:fld>
             <a:endParaRPr lang="en-US"/>
           </a:p>
@@ -1727,7 +1728,7 @@
           <a:p>
             <a:fld id="{9D9F4DAA-4C78-4901-83E9-F4ACD2ADA5B7}" type="datetimeFigureOut">
               <a:rPr lang="en-US" smtClean="0"/>
-              <a:t>03/06/2019</a:t>
+              <a:t>2/14/20</a:t>
             </a:fld>
             <a:endParaRPr lang="en-US"/>
           </a:p>
@@ -1822,7 +1823,7 @@
           <a:p>
             <a:fld id="{9D9F4DAA-4C78-4901-83E9-F4ACD2ADA5B7}" type="datetimeFigureOut">
               <a:rPr lang="en-US" smtClean="0"/>
-              <a:t>03/06/2019</a:t>
+              <a:t>2/14/20</a:t>
             </a:fld>
             <a:endParaRPr lang="en-US"/>
           </a:p>
@@ -2099,7 +2100,7 @@
           <a:p>
             <a:fld id="{9D9F4DAA-4C78-4901-83E9-F4ACD2ADA5B7}" type="datetimeFigureOut">
               <a:rPr lang="en-US" smtClean="0"/>
-              <a:t>03/06/2019</a:t>
+              <a:t>2/14/20</a:t>
             </a:fld>
             <a:endParaRPr lang="en-US"/>
           </a:p>
@@ -2356,7 +2357,7 @@
           <a:p>
             <a:fld id="{9D9F4DAA-4C78-4901-83E9-F4ACD2ADA5B7}" type="datetimeFigureOut">
               <a:rPr lang="en-US" smtClean="0"/>
-              <a:t>03/06/2019</a:t>
+              <a:t>2/14/20</a:t>
             </a:fld>
             <a:endParaRPr lang="en-US"/>
           </a:p>
@@ -2569,7 +2570,7 @@
           <a:p>
             <a:fld id="{9D9F4DAA-4C78-4901-83E9-F4ACD2ADA5B7}" type="datetimeFigureOut">
               <a:rPr lang="en-US" smtClean="0"/>
-              <a:t>03/06/2019</a:t>
+              <a:t>2/14/20</a:t>
             </a:fld>
             <a:endParaRPr lang="en-US"/>
           </a:p>
@@ -3353,6 +3354,189 @@
 </p:sld>
 </file>
 
+<file path=ppt/slides/slide3.xml><?xml version="1.0" encoding="utf-8"?>
+<p:sld xmlns:a="http://schemas.openxmlformats.org/drawingml/2006/main" xmlns:r="http://schemas.openxmlformats.org/officeDocument/2006/relationships" xmlns:p="http://schemas.openxmlformats.org/presentationml/2006/main">
+  <p:cSld>
+    <p:spTree>
+      <p:nvGrpSpPr>
+        <p:cNvPr id="1" name=""/>
+        <p:cNvGrpSpPr/>
+        <p:nvPr/>
+      </p:nvGrpSpPr>
+      <p:grpSpPr>
+        <a:xfrm>
+          <a:off x="0" y="0"/>
+          <a:ext cx="0" cy="0"/>
+          <a:chOff x="0" y="0"/>
+          <a:chExt cx="0" cy="0"/>
+        </a:xfrm>
+      </p:grpSpPr>
+      <p:pic>
+        <p:nvPicPr>
+          <p:cNvPr id="13" name="Picture 12" descr="A close up of a logo&#10;&#10;Description automatically generated">
+            <a:extLst>
+              <a:ext uri="{FF2B5EF4-FFF2-40B4-BE49-F238E27FC236}">
+                <a16:creationId xmlns:a16="http://schemas.microsoft.com/office/drawing/2014/main" id="{66A3100E-348E-4744-B8B0-8D206893AEB7}"/>
+              </a:ext>
+            </a:extLst>
+          </p:cNvPr>
+          <p:cNvPicPr>
+            <a:picLocks noChangeAspect="1"/>
+          </p:cNvPicPr>
+          <p:nvPr/>
+        </p:nvPicPr>
+        <p:blipFill>
+          <a:blip r:embed="rId2">
+            <a:extLst>
+              <a:ext uri="{28A0092B-C50C-407E-A947-70E740481C1C}">
+                <a14:useLocalDpi xmlns:a14="http://schemas.microsoft.com/office/drawing/2010/main" val="0"/>
+              </a:ext>
+            </a:extLst>
+          </a:blip>
+          <a:stretch>
+            <a:fillRect/>
+          </a:stretch>
+        </p:blipFill>
+        <p:spPr>
+          <a:xfrm>
+            <a:off x="1448736" y="703500"/>
+            <a:ext cx="1260000" cy="1260000"/>
+          </a:xfrm>
+          <a:prstGeom prst="rect">
+            <a:avLst/>
+          </a:prstGeom>
+        </p:spPr>
+      </p:pic>
+      <p:pic>
+        <p:nvPicPr>
+          <p:cNvPr id="3" name="Graphic 2" descr="Magnifying glass">
+            <a:extLst>
+              <a:ext uri="{FF2B5EF4-FFF2-40B4-BE49-F238E27FC236}">
+                <a16:creationId xmlns:a16="http://schemas.microsoft.com/office/drawing/2014/main" id="{29F65E1E-CECF-274F-A225-98BBFCD3041F}"/>
+              </a:ext>
+            </a:extLst>
+          </p:cNvPr>
+          <p:cNvPicPr>
+            <a:picLocks noChangeAspect="1"/>
+          </p:cNvPicPr>
+          <p:nvPr/>
+        </p:nvPicPr>
+        <p:blipFill>
+          <a:blip r:embed="rId3">
+            <a:extLst>
+              <a:ext uri="{28A0092B-C50C-407E-A947-70E740481C1C}">
+                <a14:useLocalDpi xmlns:a14="http://schemas.microsoft.com/office/drawing/2010/main" val="0"/>
+              </a:ext>
+              <a:ext uri="{96DAC541-7B7A-43D3-8B79-37D633B846F1}">
+                <asvg:svgBlip xmlns:asvg="http://schemas.microsoft.com/office/drawing/2016/SVG/main" r:embed="rId4"/>
+              </a:ext>
+            </a:extLst>
+          </a:blip>
+          <a:stretch>
+            <a:fillRect/>
+          </a:stretch>
+        </p:blipFill>
+        <p:spPr>
+          <a:xfrm>
+            <a:off x="1127736" y="613500"/>
+            <a:ext cx="1440000" cy="1440000"/>
+          </a:xfrm>
+          <a:prstGeom prst="rect">
+            <a:avLst/>
+          </a:prstGeom>
+        </p:spPr>
+      </p:pic>
+      <p:sp>
+        <p:nvSpPr>
+          <p:cNvPr id="14" name="TextBox 13">
+            <a:extLst>
+              <a:ext uri="{FF2B5EF4-FFF2-40B4-BE49-F238E27FC236}">
+                <a16:creationId xmlns:a16="http://schemas.microsoft.com/office/drawing/2014/main" id="{E5AF29E4-72A5-2D45-968E-E6C164874C22}"/>
+              </a:ext>
+            </a:extLst>
+          </p:cNvPr>
+          <p:cNvSpPr txBox="1"/>
+          <p:nvPr/>
+        </p:nvSpPr>
+        <p:spPr>
+          <a:xfrm>
+            <a:off x="3220362" y="1333500"/>
+            <a:ext cx="1662533" cy="461665"/>
+          </a:xfrm>
+          <a:prstGeom prst="rect">
+            <a:avLst/>
+          </a:prstGeom>
+          <a:noFill/>
+        </p:spPr>
+        <p:txBody>
+          <a:bodyPr wrap="square" rtlCol="0">
+            <a:spAutoFit/>
+          </a:bodyPr>
+          <a:lstStyle/>
+          <a:p>
+            <a:r>
+              <a:rPr lang="en-NL" sz="2400" b="1" dirty="0">
+                <a:solidFill>
+                  <a:srgbClr val="EFA627"/>
+                </a:solidFill>
+                <a:latin typeface="Open Sans Semibold" panose="020B0606030504020204" pitchFamily="34" charset="0"/>
+                <a:ea typeface="Open Sans Semibold" panose="020B0606030504020204" pitchFamily="34" charset="0"/>
+                <a:cs typeface="Open Sans Semibold" panose="020B0606030504020204" pitchFamily="34" charset="0"/>
+              </a:rPr>
+              <a:t>Academy</a:t>
+            </a:r>
+          </a:p>
+        </p:txBody>
+      </p:sp>
+      <p:pic>
+        <p:nvPicPr>
+          <p:cNvPr id="24" name="Picture 23" descr="A picture containing drawing, clock&#10;&#10;Description automatically generated">
+            <a:extLst>
+              <a:ext uri="{FF2B5EF4-FFF2-40B4-BE49-F238E27FC236}">
+                <a16:creationId xmlns:a16="http://schemas.microsoft.com/office/drawing/2014/main" id="{C2AAA20A-4730-0D4D-85DD-C251A29F921D}"/>
+              </a:ext>
+            </a:extLst>
+          </p:cNvPr>
+          <p:cNvPicPr>
+            <a:picLocks noChangeAspect="1"/>
+          </p:cNvPicPr>
+          <p:nvPr/>
+        </p:nvPicPr>
+        <p:blipFill>
+          <a:blip r:embed="rId5">
+            <a:extLst>
+              <a:ext uri="{28A0092B-C50C-407E-A947-70E740481C1C}">
+                <a14:useLocalDpi xmlns:a14="http://schemas.microsoft.com/office/drawing/2010/main" val="0"/>
+              </a:ext>
+            </a:extLst>
+          </a:blip>
+          <a:stretch>
+            <a:fillRect/>
+          </a:stretch>
+        </p:blipFill>
+        <p:spPr>
+          <a:xfrm>
+            <a:off x="2895600" y="995124"/>
+            <a:ext cx="2160000" cy="338376"/>
+          </a:xfrm>
+          <a:prstGeom prst="rect">
+            <a:avLst/>
+          </a:prstGeom>
+        </p:spPr>
+      </p:pic>
+    </p:spTree>
+    <p:extLst>
+      <p:ext uri="{BB962C8B-B14F-4D97-AF65-F5344CB8AC3E}">
+        <p14:creationId xmlns:p14="http://schemas.microsoft.com/office/powerpoint/2010/main" val="355546497"/>
+      </p:ext>
+    </p:extLst>
+  </p:cSld>
+  <p:clrMapOvr>
+    <a:masterClrMapping/>
+  </p:clrMapOvr>
+</p:sld>
+</file>
+
 <file path=ppt/theme/theme1.xml><?xml version="1.0" encoding="utf-8"?>
 <a:theme xmlns:a="http://schemas.openxmlformats.org/drawingml/2006/main" name="Office Theme">
   <a:themeElements>

</xml_diff>

<commit_message>
Add world map visualisation of student countries
</commit_message>
<xml_diff>
--- a/ehden_academy_course_images.pptx
+++ b/ehden_academy_course_images.pptx
@@ -3399,47 +3399,8 @@
         </p:blipFill>
         <p:spPr>
           <a:xfrm>
-            <a:off x="1448736" y="703500"/>
+            <a:off x="1244568" y="703500"/>
             <a:ext cx="1260000" cy="1260000"/>
-          </a:xfrm>
-          <a:prstGeom prst="rect">
-            <a:avLst/>
-          </a:prstGeom>
-        </p:spPr>
-      </p:pic>
-      <p:pic>
-        <p:nvPicPr>
-          <p:cNvPr id="3" name="Graphic 2" descr="Magnifying glass">
-            <a:extLst>
-              <a:ext uri="{FF2B5EF4-FFF2-40B4-BE49-F238E27FC236}">
-                <a16:creationId xmlns:a16="http://schemas.microsoft.com/office/drawing/2014/main" id="{29F65E1E-CECF-274F-A225-98BBFCD3041F}"/>
-              </a:ext>
-            </a:extLst>
-          </p:cNvPr>
-          <p:cNvPicPr>
-            <a:picLocks noChangeAspect="1"/>
-          </p:cNvPicPr>
-          <p:nvPr/>
-        </p:nvPicPr>
-        <p:blipFill>
-          <a:blip r:embed="rId3">
-            <a:extLst>
-              <a:ext uri="{28A0092B-C50C-407E-A947-70E740481C1C}">
-                <a14:useLocalDpi xmlns:a14="http://schemas.microsoft.com/office/drawing/2010/main" val="0"/>
-              </a:ext>
-              <a:ext uri="{96DAC541-7B7A-43D3-8B79-37D633B846F1}">
-                <asvg:svgBlip xmlns:asvg="http://schemas.microsoft.com/office/drawing/2016/SVG/main" r:embed="rId4"/>
-              </a:ext>
-            </a:extLst>
-          </a:blip>
-          <a:stretch>
-            <a:fillRect/>
-          </a:stretch>
-        </p:blipFill>
-        <p:spPr>
-          <a:xfrm>
-            <a:off x="1127736" y="613500"/>
-            <a:ext cx="1440000" cy="1440000"/>
           </a:xfrm>
           <a:prstGeom prst="rect">
             <a:avLst/>
@@ -3460,7 +3421,7 @@
         </p:nvSpPr>
         <p:spPr>
           <a:xfrm>
-            <a:off x="3220362" y="1333500"/>
+            <a:off x="3016194" y="1333500"/>
             <a:ext cx="1662533" cy="461665"/>
           </a:xfrm>
           <a:prstGeom prst="rect">
@@ -3503,7 +3464,7 @@
           <p:nvPr/>
         </p:nvPicPr>
         <p:blipFill>
-          <a:blip r:embed="rId5">
+          <a:blip r:embed="rId3">
             <a:extLst>
               <a:ext uri="{28A0092B-C50C-407E-A947-70E740481C1C}">
                 <a14:useLocalDpi xmlns:a14="http://schemas.microsoft.com/office/drawing/2010/main" val="0"/>
@@ -3516,7 +3477,7 @@
         </p:blipFill>
         <p:spPr>
           <a:xfrm>
-            <a:off x="2895600" y="995124"/>
+            <a:off x="2691432" y="995124"/>
             <a:ext cx="2160000" cy="338376"/>
           </a:xfrm>
           <a:prstGeom prst="rect">

</xml_diff>